<commit_message>
Fin des 3 laboratoires
</commit_message>
<xml_diff>
--- a/Labo04_Valgrind/schema.pptx
+++ b/Labo04_Valgrind/schema.pptx
@@ -6,6 +6,7 @@
   </p:sldMasterIdLst>
   <p:sldIdLst>
     <p:sldId id="256" r:id="rId2"/>
+    <p:sldId id="257" r:id="rId3"/>
   </p:sldIdLst>
   <p:sldSz cx="12192000" cy="6858000"/>
   <p:notesSz cx="6858000" cy="9144000"/>
@@ -259,7 +260,7 @@
           <a:p>
             <a:fld id="{90D4CFDA-A83D-4D8D-A2D8-089677C363BF}" type="datetimeFigureOut">
               <a:rPr lang="fr-FR" smtClean="0"/>
-              <a:t>06/11/2021</a:t>
+              <a:t>07/11/2021</a:t>
             </a:fld>
             <a:endParaRPr lang="fr-FR"/>
           </a:p>
@@ -457,7 +458,7 @@
           <a:p>
             <a:fld id="{90D4CFDA-A83D-4D8D-A2D8-089677C363BF}" type="datetimeFigureOut">
               <a:rPr lang="fr-FR" smtClean="0"/>
-              <a:t>06/11/2021</a:t>
+              <a:t>07/11/2021</a:t>
             </a:fld>
             <a:endParaRPr lang="fr-FR"/>
           </a:p>
@@ -665,7 +666,7 @@
           <a:p>
             <a:fld id="{90D4CFDA-A83D-4D8D-A2D8-089677C363BF}" type="datetimeFigureOut">
               <a:rPr lang="fr-FR" smtClean="0"/>
-              <a:t>06/11/2021</a:t>
+              <a:t>07/11/2021</a:t>
             </a:fld>
             <a:endParaRPr lang="fr-FR"/>
           </a:p>
@@ -863,7 +864,7 @@
           <a:p>
             <a:fld id="{90D4CFDA-A83D-4D8D-A2D8-089677C363BF}" type="datetimeFigureOut">
               <a:rPr lang="fr-FR" smtClean="0"/>
-              <a:t>06/11/2021</a:t>
+              <a:t>07/11/2021</a:t>
             </a:fld>
             <a:endParaRPr lang="fr-FR"/>
           </a:p>
@@ -1138,7 +1139,7 @@
           <a:p>
             <a:fld id="{90D4CFDA-A83D-4D8D-A2D8-089677C363BF}" type="datetimeFigureOut">
               <a:rPr lang="fr-FR" smtClean="0"/>
-              <a:t>06/11/2021</a:t>
+              <a:t>07/11/2021</a:t>
             </a:fld>
             <a:endParaRPr lang="fr-FR"/>
           </a:p>
@@ -1403,7 +1404,7 @@
           <a:p>
             <a:fld id="{90D4CFDA-A83D-4D8D-A2D8-089677C363BF}" type="datetimeFigureOut">
               <a:rPr lang="fr-FR" smtClean="0"/>
-              <a:t>06/11/2021</a:t>
+              <a:t>07/11/2021</a:t>
             </a:fld>
             <a:endParaRPr lang="fr-FR"/>
           </a:p>
@@ -1815,7 +1816,7 @@
           <a:p>
             <a:fld id="{90D4CFDA-A83D-4D8D-A2D8-089677C363BF}" type="datetimeFigureOut">
               <a:rPr lang="fr-FR" smtClean="0"/>
-              <a:t>06/11/2021</a:t>
+              <a:t>07/11/2021</a:t>
             </a:fld>
             <a:endParaRPr lang="fr-FR"/>
           </a:p>
@@ -1956,7 +1957,7 @@
           <a:p>
             <a:fld id="{90D4CFDA-A83D-4D8D-A2D8-089677C363BF}" type="datetimeFigureOut">
               <a:rPr lang="fr-FR" smtClean="0"/>
-              <a:t>06/11/2021</a:t>
+              <a:t>07/11/2021</a:t>
             </a:fld>
             <a:endParaRPr lang="fr-FR"/>
           </a:p>
@@ -2069,7 +2070,7 @@
           <a:p>
             <a:fld id="{90D4CFDA-A83D-4D8D-A2D8-089677C363BF}" type="datetimeFigureOut">
               <a:rPr lang="fr-FR" smtClean="0"/>
-              <a:t>06/11/2021</a:t>
+              <a:t>07/11/2021</a:t>
             </a:fld>
             <a:endParaRPr lang="fr-FR"/>
           </a:p>
@@ -2380,7 +2381,7 @@
           <a:p>
             <a:fld id="{90D4CFDA-A83D-4D8D-A2D8-089677C363BF}" type="datetimeFigureOut">
               <a:rPr lang="fr-FR" smtClean="0"/>
-              <a:t>06/11/2021</a:t>
+              <a:t>07/11/2021</a:t>
             </a:fld>
             <a:endParaRPr lang="fr-FR"/>
           </a:p>
@@ -2668,7 +2669,7 @@
           <a:p>
             <a:fld id="{90D4CFDA-A83D-4D8D-A2D8-089677C363BF}" type="datetimeFigureOut">
               <a:rPr lang="fr-FR" smtClean="0"/>
-              <a:t>06/11/2021</a:t>
+              <a:t>07/11/2021</a:t>
             </a:fld>
             <a:endParaRPr lang="fr-FR"/>
           </a:p>
@@ -2909,7 +2910,7 @@
           <a:p>
             <a:fld id="{90D4CFDA-A83D-4D8D-A2D8-089677C363BF}" type="datetimeFigureOut">
               <a:rPr lang="fr-FR" smtClean="0"/>
-              <a:t>06/11/2021</a:t>
+              <a:t>07/11/2021</a:t>
             </a:fld>
             <a:endParaRPr lang="fr-FR"/>
           </a:p>
@@ -4293,6 +4294,525 @@
 </p:sld>
 </file>
 
+<file path=ppt/slides/slide2.xml><?xml version="1.0" encoding="utf-8"?>
+<p:sld xmlns:a="http://schemas.openxmlformats.org/drawingml/2006/main" xmlns:r="http://schemas.openxmlformats.org/officeDocument/2006/relationships" xmlns:p="http://schemas.openxmlformats.org/presentationml/2006/main">
+  <p:cSld>
+    <p:spTree>
+      <p:nvGrpSpPr>
+        <p:cNvPr id="1" name=""/>
+        <p:cNvGrpSpPr/>
+        <p:nvPr/>
+      </p:nvGrpSpPr>
+      <p:grpSpPr>
+        <a:xfrm>
+          <a:off x="0" y="0"/>
+          <a:ext cx="0" cy="0"/>
+          <a:chOff x="0" y="0"/>
+          <a:chExt cx="0" cy="0"/>
+        </a:xfrm>
+      </p:grpSpPr>
+      <p:sp>
+        <p:nvSpPr>
+          <p:cNvPr id="25" name="Rectangle 24">
+            <a:extLst>
+              <a:ext uri="{FF2B5EF4-FFF2-40B4-BE49-F238E27FC236}">
+                <a16:creationId xmlns:a16="http://schemas.microsoft.com/office/drawing/2014/main" id="{64F81BEB-6A17-4887-BFFD-208FD66DC6AF}"/>
+              </a:ext>
+            </a:extLst>
+          </p:cNvPr>
+          <p:cNvSpPr/>
+          <p:nvPr/>
+        </p:nvSpPr>
+        <p:spPr>
+          <a:xfrm>
+            <a:off x="2288275" y="1611769"/>
+            <a:ext cx="2558327" cy="331076"/>
+          </a:xfrm>
+          <a:prstGeom prst="rect">
+            <a:avLst/>
+          </a:prstGeom>
+        </p:spPr>
+        <p:style>
+          <a:lnRef idx="2">
+            <a:schemeClr val="dk1"/>
+          </a:lnRef>
+          <a:fillRef idx="1">
+            <a:schemeClr val="lt1"/>
+          </a:fillRef>
+          <a:effectRef idx="0">
+            <a:schemeClr val="dk1"/>
+          </a:effectRef>
+          <a:fontRef idx="minor">
+            <a:schemeClr val="dk1"/>
+          </a:fontRef>
+        </p:style>
+        <p:txBody>
+          <a:bodyPr rtlCol="0" anchor="ctr"/>
+          <a:lstStyle/>
+          <a:p>
+            <a:pPr algn="ctr"/>
+            <a:endParaRPr lang="fr-FR"/>
+          </a:p>
+        </p:txBody>
+      </p:sp>
+      <p:sp>
+        <p:nvSpPr>
+          <p:cNvPr id="27" name="Rectangle 26">
+            <a:extLst>
+              <a:ext uri="{FF2B5EF4-FFF2-40B4-BE49-F238E27FC236}">
+                <a16:creationId xmlns:a16="http://schemas.microsoft.com/office/drawing/2014/main" id="{06CC165A-0122-46E2-9A22-85074E2A3959}"/>
+              </a:ext>
+            </a:extLst>
+          </p:cNvPr>
+          <p:cNvSpPr/>
+          <p:nvPr/>
+        </p:nvSpPr>
+        <p:spPr>
+          <a:xfrm>
+            <a:off x="2288275" y="1942844"/>
+            <a:ext cx="2558328" cy="736665"/>
+          </a:xfrm>
+          <a:prstGeom prst="rect">
+            <a:avLst/>
+          </a:prstGeom>
+        </p:spPr>
+        <p:style>
+          <a:lnRef idx="2">
+            <a:schemeClr val="dk1"/>
+          </a:lnRef>
+          <a:fillRef idx="1">
+            <a:schemeClr val="lt1"/>
+          </a:fillRef>
+          <a:effectRef idx="0">
+            <a:schemeClr val="dk1"/>
+          </a:effectRef>
+          <a:fontRef idx="minor">
+            <a:schemeClr val="dk1"/>
+          </a:fontRef>
+        </p:style>
+        <p:txBody>
+          <a:bodyPr rtlCol="0" anchor="ctr"/>
+          <a:lstStyle/>
+          <a:p>
+            <a:pPr algn="ctr"/>
+            <a:endParaRPr lang="fr-FR"/>
+          </a:p>
+        </p:txBody>
+      </p:sp>
+      <p:sp>
+        <p:nvSpPr>
+          <p:cNvPr id="28" name="ZoneTexte 27">
+            <a:extLst>
+              <a:ext uri="{FF2B5EF4-FFF2-40B4-BE49-F238E27FC236}">
+                <a16:creationId xmlns:a16="http://schemas.microsoft.com/office/drawing/2014/main" id="{3EBC6D61-3BA3-4BA8-849D-566E3DE4E85B}"/>
+              </a:ext>
+            </a:extLst>
+          </p:cNvPr>
+          <p:cNvSpPr txBox="1"/>
+          <p:nvPr/>
+        </p:nvSpPr>
+        <p:spPr>
+          <a:xfrm>
+            <a:off x="2253527" y="1915806"/>
+            <a:ext cx="597338" cy="276999"/>
+          </a:xfrm>
+          <a:prstGeom prst="rect">
+            <a:avLst/>
+          </a:prstGeom>
+          <a:noFill/>
+        </p:spPr>
+        <p:txBody>
+          <a:bodyPr wrap="square" rtlCol="0">
+            <a:spAutoFit/>
+          </a:bodyPr>
+          <a:lstStyle/>
+          <a:p>
+            <a:r>
+              <a:rPr lang="fr-CH" sz="1200" dirty="0"/>
+              <a:t>kernel</a:t>
+            </a:r>
+            <a:endParaRPr lang="fr-FR" sz="1200" dirty="0"/>
+          </a:p>
+        </p:txBody>
+      </p:sp>
+      <p:sp>
+        <p:nvSpPr>
+          <p:cNvPr id="32" name="ZoneTexte 31">
+            <a:extLst>
+              <a:ext uri="{FF2B5EF4-FFF2-40B4-BE49-F238E27FC236}">
+                <a16:creationId xmlns:a16="http://schemas.microsoft.com/office/drawing/2014/main" id="{34291BD1-C198-4A76-83CC-9FCED33906F2}"/>
+              </a:ext>
+            </a:extLst>
+          </p:cNvPr>
+          <p:cNvSpPr txBox="1"/>
+          <p:nvPr/>
+        </p:nvSpPr>
+        <p:spPr>
+          <a:xfrm>
+            <a:off x="2253528" y="1638807"/>
+            <a:ext cx="1026484" cy="276999"/>
+          </a:xfrm>
+          <a:prstGeom prst="rect">
+            <a:avLst/>
+          </a:prstGeom>
+          <a:noFill/>
+        </p:spPr>
+        <p:txBody>
+          <a:bodyPr wrap="square" rtlCol="0">
+            <a:spAutoFit/>
+          </a:bodyPr>
+          <a:lstStyle/>
+          <a:p>
+            <a:r>
+              <a:rPr lang="en-US" sz="1200" dirty="0"/>
+              <a:t>userspace</a:t>
+            </a:r>
+          </a:p>
+        </p:txBody>
+      </p:sp>
+      <p:sp>
+        <p:nvSpPr>
+          <p:cNvPr id="33" name="ZoneTexte 32">
+            <a:extLst>
+              <a:ext uri="{FF2B5EF4-FFF2-40B4-BE49-F238E27FC236}">
+                <a16:creationId xmlns:a16="http://schemas.microsoft.com/office/drawing/2014/main" id="{56BCA237-CA74-4BCB-B60D-7F1D37BE1FE0}"/>
+              </a:ext>
+            </a:extLst>
+          </p:cNvPr>
+          <p:cNvSpPr txBox="1"/>
+          <p:nvPr/>
+        </p:nvSpPr>
+        <p:spPr>
+          <a:xfrm>
+            <a:off x="4789736" y="1915806"/>
+            <a:ext cx="597338" cy="276999"/>
+          </a:xfrm>
+          <a:prstGeom prst="rect">
+            <a:avLst/>
+          </a:prstGeom>
+          <a:noFill/>
+        </p:spPr>
+        <p:txBody>
+          <a:bodyPr wrap="square" rtlCol="0">
+            <a:spAutoFit/>
+          </a:bodyPr>
+          <a:lstStyle/>
+          <a:p>
+            <a:r>
+              <a:rPr lang="fr-CH" sz="1200" dirty="0"/>
+              <a:t>usb.o</a:t>
+            </a:r>
+            <a:endParaRPr lang="fr-FR" sz="1200" dirty="0"/>
+          </a:p>
+        </p:txBody>
+      </p:sp>
+      <p:sp>
+        <p:nvSpPr>
+          <p:cNvPr id="34" name="ZoneTexte 33">
+            <a:extLst>
+              <a:ext uri="{FF2B5EF4-FFF2-40B4-BE49-F238E27FC236}">
+                <a16:creationId xmlns:a16="http://schemas.microsoft.com/office/drawing/2014/main" id="{318EDFD1-5135-4665-B93E-D48BF38DAF29}"/>
+              </a:ext>
+            </a:extLst>
+          </p:cNvPr>
+          <p:cNvSpPr txBox="1"/>
+          <p:nvPr/>
+        </p:nvSpPr>
+        <p:spPr>
+          <a:xfrm>
+            <a:off x="2822432" y="2172677"/>
+            <a:ext cx="597338" cy="276999"/>
+          </a:xfrm>
+          <a:prstGeom prst="rect">
+            <a:avLst/>
+          </a:prstGeom>
+          <a:noFill/>
+        </p:spPr>
+        <p:txBody>
+          <a:bodyPr wrap="square" rtlCol="0">
+            <a:spAutoFit/>
+          </a:bodyPr>
+          <a:lstStyle/>
+          <a:p>
+            <a:r>
+              <a:rPr lang="fr-CH" sz="1200" dirty="0">
+                <a:solidFill>
+                  <a:srgbClr val="0070C0"/>
+                </a:solidFill>
+              </a:rPr>
+              <a:t>usb.ko</a:t>
+            </a:r>
+            <a:endParaRPr lang="fr-FR" sz="1200" dirty="0">
+              <a:solidFill>
+                <a:srgbClr val="0070C0"/>
+              </a:solidFill>
+            </a:endParaRPr>
+          </a:p>
+        </p:txBody>
+      </p:sp>
+      <p:sp>
+        <p:nvSpPr>
+          <p:cNvPr id="35" name="Rectangle 34">
+            <a:extLst>
+              <a:ext uri="{FF2B5EF4-FFF2-40B4-BE49-F238E27FC236}">
+                <a16:creationId xmlns:a16="http://schemas.microsoft.com/office/drawing/2014/main" id="{A7A98957-A926-449E-84C9-5F03E3B458EA}"/>
+              </a:ext>
+            </a:extLst>
+          </p:cNvPr>
+          <p:cNvSpPr/>
+          <p:nvPr/>
+        </p:nvSpPr>
+        <p:spPr>
+          <a:xfrm>
+            <a:off x="2288275" y="3288169"/>
+            <a:ext cx="2558327" cy="331076"/>
+          </a:xfrm>
+          <a:prstGeom prst="rect">
+            <a:avLst/>
+          </a:prstGeom>
+        </p:spPr>
+        <p:style>
+          <a:lnRef idx="2">
+            <a:schemeClr val="dk1"/>
+          </a:lnRef>
+          <a:fillRef idx="1">
+            <a:schemeClr val="lt1"/>
+          </a:fillRef>
+          <a:effectRef idx="0">
+            <a:schemeClr val="dk1"/>
+          </a:effectRef>
+          <a:fontRef idx="minor">
+            <a:schemeClr val="dk1"/>
+          </a:fontRef>
+        </p:style>
+        <p:txBody>
+          <a:bodyPr rtlCol="0" anchor="ctr"/>
+          <a:lstStyle/>
+          <a:p>
+            <a:pPr algn="ctr"/>
+            <a:endParaRPr lang="fr-FR"/>
+          </a:p>
+        </p:txBody>
+      </p:sp>
+      <p:sp>
+        <p:nvSpPr>
+          <p:cNvPr id="36" name="Rectangle 35">
+            <a:extLst>
+              <a:ext uri="{FF2B5EF4-FFF2-40B4-BE49-F238E27FC236}">
+                <a16:creationId xmlns:a16="http://schemas.microsoft.com/office/drawing/2014/main" id="{2967E404-28C3-474D-8423-3E658E241B27}"/>
+              </a:ext>
+            </a:extLst>
+          </p:cNvPr>
+          <p:cNvSpPr/>
+          <p:nvPr/>
+        </p:nvSpPr>
+        <p:spPr>
+          <a:xfrm>
+            <a:off x="2288275" y="3619244"/>
+            <a:ext cx="2558328" cy="736665"/>
+          </a:xfrm>
+          <a:prstGeom prst="rect">
+            <a:avLst/>
+          </a:prstGeom>
+        </p:spPr>
+        <p:style>
+          <a:lnRef idx="2">
+            <a:schemeClr val="dk1"/>
+          </a:lnRef>
+          <a:fillRef idx="1">
+            <a:schemeClr val="lt1"/>
+          </a:fillRef>
+          <a:effectRef idx="0">
+            <a:schemeClr val="dk1"/>
+          </a:effectRef>
+          <a:fontRef idx="minor">
+            <a:schemeClr val="dk1"/>
+          </a:fontRef>
+        </p:style>
+        <p:txBody>
+          <a:bodyPr rtlCol="0" anchor="ctr"/>
+          <a:lstStyle/>
+          <a:p>
+            <a:pPr algn="ctr"/>
+            <a:endParaRPr lang="fr-FR"/>
+          </a:p>
+        </p:txBody>
+      </p:sp>
+      <p:sp>
+        <p:nvSpPr>
+          <p:cNvPr id="37" name="ZoneTexte 36">
+            <a:extLst>
+              <a:ext uri="{FF2B5EF4-FFF2-40B4-BE49-F238E27FC236}">
+                <a16:creationId xmlns:a16="http://schemas.microsoft.com/office/drawing/2014/main" id="{6D72835E-DCF2-4824-9898-7612C8DB5BF5}"/>
+              </a:ext>
+            </a:extLst>
+          </p:cNvPr>
+          <p:cNvSpPr txBox="1"/>
+          <p:nvPr/>
+        </p:nvSpPr>
+        <p:spPr>
+          <a:xfrm>
+            <a:off x="2253526" y="3592206"/>
+            <a:ext cx="1877195" cy="276999"/>
+          </a:xfrm>
+          <a:prstGeom prst="rect">
+            <a:avLst/>
+          </a:prstGeom>
+          <a:noFill/>
+        </p:spPr>
+        <p:txBody>
+          <a:bodyPr wrap="square" rtlCol="0">
+            <a:spAutoFit/>
+          </a:bodyPr>
+          <a:lstStyle/>
+          <a:p>
+            <a:r>
+              <a:rPr lang="fr-CH" sz="1200" dirty="0"/>
+              <a:t>/lib/modules/5.0.6/kernel</a:t>
+            </a:r>
+            <a:endParaRPr lang="fr-FR" sz="1200" dirty="0"/>
+          </a:p>
+        </p:txBody>
+      </p:sp>
+      <p:sp>
+        <p:nvSpPr>
+          <p:cNvPr id="38" name="ZoneTexte 37">
+            <a:extLst>
+              <a:ext uri="{FF2B5EF4-FFF2-40B4-BE49-F238E27FC236}">
+                <a16:creationId xmlns:a16="http://schemas.microsoft.com/office/drawing/2014/main" id="{5DAFB6ED-3DBF-4D3D-8F19-0F2AE9D1C102}"/>
+              </a:ext>
+            </a:extLst>
+          </p:cNvPr>
+          <p:cNvSpPr txBox="1"/>
+          <p:nvPr/>
+        </p:nvSpPr>
+        <p:spPr>
+          <a:xfrm>
+            <a:off x="2253528" y="3315207"/>
+            <a:ext cx="1026484" cy="276999"/>
+          </a:xfrm>
+          <a:prstGeom prst="rect">
+            <a:avLst/>
+          </a:prstGeom>
+          <a:noFill/>
+        </p:spPr>
+        <p:txBody>
+          <a:bodyPr wrap="square" rtlCol="0">
+            <a:spAutoFit/>
+          </a:bodyPr>
+          <a:lstStyle/>
+          <a:p>
+            <a:r>
+              <a:rPr lang="fr-CH" sz="1200" dirty="0"/>
+              <a:t>hard disk</a:t>
+            </a:r>
+            <a:endParaRPr lang="fr-FR" sz="1200" dirty="0"/>
+          </a:p>
+        </p:txBody>
+      </p:sp>
+      <p:sp>
+        <p:nvSpPr>
+          <p:cNvPr id="40" name="ZoneTexte 39">
+            <a:extLst>
+              <a:ext uri="{FF2B5EF4-FFF2-40B4-BE49-F238E27FC236}">
+                <a16:creationId xmlns:a16="http://schemas.microsoft.com/office/drawing/2014/main" id="{463BE562-CBF3-416C-BC10-4549E58A3676}"/>
+              </a:ext>
+            </a:extLst>
+          </p:cNvPr>
+          <p:cNvSpPr txBox="1"/>
+          <p:nvPr/>
+        </p:nvSpPr>
+        <p:spPr>
+          <a:xfrm>
+            <a:off x="2822432" y="3849077"/>
+            <a:ext cx="597338" cy="276999"/>
+          </a:xfrm>
+          <a:prstGeom prst="rect">
+            <a:avLst/>
+          </a:prstGeom>
+          <a:noFill/>
+        </p:spPr>
+        <p:txBody>
+          <a:bodyPr wrap="square" rtlCol="0">
+            <a:spAutoFit/>
+          </a:bodyPr>
+          <a:lstStyle/>
+          <a:p>
+            <a:r>
+              <a:rPr lang="fr-CH" sz="1200" dirty="0">
+                <a:solidFill>
+                  <a:srgbClr val="FF0000"/>
+                </a:solidFill>
+              </a:rPr>
+              <a:t>usb.ko</a:t>
+            </a:r>
+            <a:endParaRPr lang="fr-FR" sz="1200" dirty="0">
+              <a:solidFill>
+                <a:srgbClr val="FF0000"/>
+              </a:solidFill>
+            </a:endParaRPr>
+          </a:p>
+        </p:txBody>
+      </p:sp>
+      <p:cxnSp>
+        <p:nvCxnSpPr>
+          <p:cNvPr id="41" name="Connecteur : en arc 40">
+            <a:extLst>
+              <a:ext uri="{FF2B5EF4-FFF2-40B4-BE49-F238E27FC236}">
+                <a16:creationId xmlns:a16="http://schemas.microsoft.com/office/drawing/2014/main" id="{8B0A2F7A-260F-4420-875C-94F8C7FC53DB}"/>
+              </a:ext>
+            </a:extLst>
+          </p:cNvPr>
+          <p:cNvCxnSpPr>
+            <a:cxnSpLocks/>
+          </p:cNvCxnSpPr>
+          <p:nvPr/>
+        </p:nvCxnSpPr>
+        <p:spPr>
+          <a:xfrm rot="10800000">
+            <a:off x="2269224" y="2679509"/>
+            <a:ext cx="12700" cy="1319048"/>
+          </a:xfrm>
+          <a:prstGeom prst="curvedConnector3">
+            <a:avLst>
+              <a:gd name="adj1" fmla="val 3200000"/>
+            </a:avLst>
+          </a:prstGeom>
+          <a:ln w="12700">
+            <a:solidFill>
+              <a:srgbClr val="FF0000"/>
+            </a:solidFill>
+            <a:tailEnd type="triangle"/>
+          </a:ln>
+        </p:spPr>
+        <p:style>
+          <a:lnRef idx="1">
+            <a:schemeClr val="accent1"/>
+          </a:lnRef>
+          <a:fillRef idx="0">
+            <a:schemeClr val="accent1"/>
+          </a:fillRef>
+          <a:effectRef idx="0">
+            <a:schemeClr val="accent1"/>
+          </a:effectRef>
+          <a:fontRef idx="minor">
+            <a:schemeClr val="tx1"/>
+          </a:fontRef>
+        </p:style>
+      </p:cxnSp>
+    </p:spTree>
+    <p:extLst>
+      <p:ext uri="{BB962C8B-B14F-4D97-AF65-F5344CB8AC3E}">
+        <p14:creationId xmlns:p14="http://schemas.microsoft.com/office/powerpoint/2010/main" val="3427136252"/>
+      </p:ext>
+    </p:extLst>
+  </p:cSld>
+  <p:clrMapOvr>
+    <a:masterClrMapping/>
+  </p:clrMapOvr>
+</p:sld>
+</file>
+
 <file path=ppt/theme/theme1.xml><?xml version="1.0" encoding="utf-8"?>
 <a:theme xmlns:a="http://schemas.openxmlformats.org/drawingml/2006/main" name="Thème Office">
   <a:themeElements>

</xml_diff>